<commit_message>
updated a cleaner code
Signed-off-by: Albert <wensinlor@gmail.com>
</commit_message>
<xml_diff>
--- a/Meeting_Materials/Ergonomics Semester 2 Week 11.pptx
+++ b/Meeting_Materials/Ergonomics Semester 2 Week 11.pptx
@@ -5,16 +5,19 @@
     <p:sldMasterId id="2147483710" r:id="rId4"/>
   </p:sldMasterIdLst>
   <p:notesMasterIdLst>
-    <p:notesMasterId r:id="rId12"/>
+    <p:notesMasterId r:id="rId15"/>
   </p:notesMasterIdLst>
   <p:sldIdLst>
     <p:sldId id="257" r:id="rId5"/>
     <p:sldId id="258" r:id="rId6"/>
     <p:sldId id="259" r:id="rId7"/>
-    <p:sldId id="273" r:id="rId8"/>
+    <p:sldId id="276" r:id="rId8"/>
     <p:sldId id="275" r:id="rId9"/>
     <p:sldId id="268" r:id="rId10"/>
-    <p:sldId id="269" r:id="rId11"/>
+    <p:sldId id="277" r:id="rId11"/>
+    <p:sldId id="278" r:id="rId12"/>
+    <p:sldId id="279" r:id="rId13"/>
+    <p:sldId id="269" r:id="rId14"/>
   </p:sldIdLst>
   <p:sldSz cx="12192000" cy="6858000"/>
   <p:notesSz cx="6858000" cy="9144000"/>
@@ -209,7 +212,7 @@
           <a:p>
             <a:fld id="{22B1E1AC-897E-4258-89CC-349F958F3456}" type="datetimeFigureOut">
               <a:rPr lang="en-US" smtClean="0"/>
-              <a:t>3/29/2023</a:t>
+              <a:t>4/1/2023</a:t>
             </a:fld>
             <a:endParaRPr lang="en-US"/>
           </a:p>
@@ -583,7 +586,7 @@
           <a:p>
             <a:fld id="{032246CF-3E64-44D5-82D2-E6C647CC0300}" type="datetime1">
               <a:rPr lang="en-US" smtClean="0"/>
-              <a:t>3/29/2023</a:t>
+              <a:t>4/1/2023</a:t>
             </a:fld>
             <a:endParaRPr lang="en-US"/>
           </a:p>
@@ -1111,7 +1114,7 @@
           <a:p>
             <a:fld id="{3753495E-55A6-46D8-A35E-192AB95FCC1E}" type="datetime1">
               <a:rPr lang="en-US" smtClean="0"/>
-              <a:t>3/29/2023</a:t>
+              <a:t>4/1/2023</a:t>
             </a:fld>
             <a:endParaRPr lang="en-US"/>
           </a:p>
@@ -1461,7 +1464,7 @@
           <a:p>
             <a:fld id="{7565C209-6024-4AE8-994C-64E567FE647E}" type="datetime1">
               <a:rPr lang="en-US" smtClean="0"/>
-              <a:t>3/29/2023</a:t>
+              <a:t>4/1/2023</a:t>
             </a:fld>
             <a:endParaRPr lang="en-US"/>
           </a:p>
@@ -2531,6 +2534,189 @@
 </p:sld>
 </file>
 
+<file path=ppt/slides/slide10.xml><?xml version="1.0" encoding="utf-8"?>
+<p:sld xmlns:a="http://schemas.openxmlformats.org/drawingml/2006/main" xmlns:r="http://schemas.openxmlformats.org/officeDocument/2006/relationships" xmlns:p="http://schemas.openxmlformats.org/presentationml/2006/main">
+  <p:cSld>
+    <p:spTree>
+      <p:nvGrpSpPr>
+        <p:cNvPr id="1" name=""/>
+        <p:cNvGrpSpPr/>
+        <p:nvPr/>
+      </p:nvGrpSpPr>
+      <p:grpSpPr>
+        <a:xfrm>
+          <a:off x="0" y="0"/>
+          <a:ext cx="0" cy="0"/>
+          <a:chOff x="0" y="0"/>
+          <a:chExt cx="0" cy="0"/>
+        </a:xfrm>
+      </p:grpSpPr>
+      <p:sp>
+        <p:nvSpPr>
+          <p:cNvPr id="2" name="Title 1">
+            <a:extLst>
+              <a:ext uri="{FF2B5EF4-FFF2-40B4-BE49-F238E27FC236}">
+                <a16:creationId xmlns:a16="http://schemas.microsoft.com/office/drawing/2014/main" id="{7A52E233-DA80-5A3A-534F-8A98B545F1D9}"/>
+              </a:ext>
+            </a:extLst>
+          </p:cNvPr>
+          <p:cNvSpPr>
+            <a:spLocks noGrp="1"/>
+          </p:cNvSpPr>
+          <p:nvPr>
+            <p:ph type="title"/>
+          </p:nvPr>
+        </p:nvSpPr>
+        <p:spPr/>
+        <p:txBody>
+          <a:bodyPr/>
+          <a:lstStyle/>
+          <a:p>
+            <a:r>
+              <a:rPr lang="en-MY" dirty="0"/>
+              <a:t>Next Meeting</a:t>
+            </a:r>
+            <a:endParaRPr lang="en-US" dirty="0"/>
+          </a:p>
+        </p:txBody>
+      </p:sp>
+      <p:sp>
+        <p:nvSpPr>
+          <p:cNvPr id="6" name="TextBox 5">
+            <a:extLst>
+              <a:ext uri="{FF2B5EF4-FFF2-40B4-BE49-F238E27FC236}">
+                <a16:creationId xmlns:a16="http://schemas.microsoft.com/office/drawing/2014/main" id="{5CD50B1F-CE0D-FED6-70A2-576A7E6C8A86}"/>
+              </a:ext>
+            </a:extLst>
+          </p:cNvPr>
+          <p:cNvSpPr txBox="1"/>
+          <p:nvPr/>
+        </p:nvSpPr>
+        <p:spPr>
+          <a:xfrm>
+            <a:off x="839585" y="2014194"/>
+            <a:ext cx="10687130" cy="4447500"/>
+          </a:xfrm>
+          <a:prstGeom prst="rect">
+            <a:avLst/>
+          </a:prstGeom>
+          <a:noFill/>
+        </p:spPr>
+        <p:txBody>
+          <a:bodyPr wrap="square" rtlCol="0">
+            <a:spAutoFit/>
+          </a:bodyPr>
+          <a:lstStyle/>
+          <a:p>
+            <a:pPr marL="342900" indent="-342900">
+              <a:lnSpc>
+                <a:spcPct val="200000"/>
+              </a:lnSpc>
+              <a:buAutoNum type="arabicPeriod"/>
+            </a:pPr>
+            <a:r>
+              <a:rPr lang="en-US" dirty="0"/>
+              <a:t>Looking for the way to convert to c3d file</a:t>
+            </a:r>
+          </a:p>
+          <a:p>
+            <a:pPr marL="342900" indent="-342900">
+              <a:lnSpc>
+                <a:spcPct val="200000"/>
+              </a:lnSpc>
+              <a:buAutoNum type="arabicPeriod"/>
+            </a:pPr>
+            <a:r>
+              <a:rPr lang="en-US" dirty="0"/>
+              <a:t>Conclude our current results</a:t>
+            </a:r>
+          </a:p>
+          <a:p>
+            <a:pPr marL="342900" indent="-342900">
+              <a:lnSpc>
+                <a:spcPct val="200000"/>
+              </a:lnSpc>
+              <a:buAutoNum type="arabicPeriod"/>
+            </a:pPr>
+            <a:r>
+              <a:rPr lang="en-US" dirty="0"/>
+              <a:t>Plan for the next step (research paper)</a:t>
+            </a:r>
+          </a:p>
+          <a:p>
+            <a:pPr marL="342900" indent="-342900">
+              <a:lnSpc>
+                <a:spcPct val="200000"/>
+              </a:lnSpc>
+              <a:buAutoNum type="arabicPeriod"/>
+            </a:pPr>
+            <a:r>
+              <a:rPr lang="en-US" dirty="0">
+                <a:hlinkClick r:id="rId2"/>
+              </a:rPr>
+              <a:t>https://simtk-confluence.stanford.edu:8443/display/OpenSim/Tutorial+3+-+Scaling%2C+Inverse+Kinematics%2C+and+Inverse+Dynamics</a:t>
+            </a:r>
+            <a:endParaRPr lang="en-US" dirty="0"/>
+          </a:p>
+          <a:p>
+            <a:pPr marL="342900" indent="-342900">
+              <a:lnSpc>
+                <a:spcPct val="200000"/>
+              </a:lnSpc>
+              <a:buAutoNum type="arabicPeriod"/>
+            </a:pPr>
+            <a:r>
+              <a:rPr lang="en-US">
+                <a:hlinkClick r:id="rId3"/>
+              </a:rPr>
+              <a:t>https://simtk-confluence.stanford.edu:8443/display/OpenSim/Getting+Started+with+Inverse+Kinematics#GettingStartedwithInverseKinematics-Inputs</a:t>
+            </a:r>
+            <a:endParaRPr lang="en-US" dirty="0"/>
+          </a:p>
+        </p:txBody>
+      </p:sp>
+      <p:sp>
+        <p:nvSpPr>
+          <p:cNvPr id="3" name="Slide Number Placeholder 2">
+            <a:extLst>
+              <a:ext uri="{FF2B5EF4-FFF2-40B4-BE49-F238E27FC236}">
+                <a16:creationId xmlns:a16="http://schemas.microsoft.com/office/drawing/2014/main" id="{91D23FCB-73D4-C331-2251-938DEFF248B4}"/>
+              </a:ext>
+            </a:extLst>
+          </p:cNvPr>
+          <p:cNvSpPr>
+            <a:spLocks noGrp="1"/>
+          </p:cNvSpPr>
+          <p:nvPr>
+            <p:ph type="sldNum" sz="quarter" idx="12"/>
+          </p:nvPr>
+        </p:nvSpPr>
+        <p:spPr/>
+        <p:txBody>
+          <a:bodyPr/>
+          <a:lstStyle/>
+          <a:p>
+            <a:fld id="{34B7E4EF-A1BD-40F4-AB7B-04F084DD991D}" type="slidenum">
+              <a:rPr lang="en-US" smtClean="0"/>
+              <a:t>10</a:t>
+            </a:fld>
+            <a:endParaRPr lang="en-US"/>
+          </a:p>
+        </p:txBody>
+      </p:sp>
+    </p:spTree>
+    <p:extLst>
+      <p:ext uri="{BB962C8B-B14F-4D97-AF65-F5344CB8AC3E}">
+        <p14:creationId xmlns:p14="http://schemas.microsoft.com/office/powerpoint/2010/main" val="2699799663"/>
+      </p:ext>
+    </p:extLst>
+  </p:cSld>
+  <p:clrMapOvr>
+    <a:masterClrMapping/>
+  </p:clrMapOvr>
+</p:sld>
+</file>
+
 <file path=ppt/slides/slide2.xml><?xml version="1.0" encoding="utf-8"?>
 <p:sld xmlns:a="http://schemas.openxmlformats.org/drawingml/2006/main" xmlns:r="http://schemas.openxmlformats.org/officeDocument/2006/relationships" xmlns:p="http://schemas.openxmlformats.org/presentationml/2006/main">
   <p:cSld>
@@ -2592,7 +2778,7 @@
         <p:spPr>
           <a:xfrm>
             <a:off x="1396538" y="2014194"/>
-            <a:ext cx="8478982" cy="923330"/>
+            <a:ext cx="8478982" cy="369332"/>
           </a:xfrm>
           <a:prstGeom prst="rect">
             <a:avLst/>
@@ -2610,23 +2796,8 @@
             </a:pPr>
             <a:r>
               <a:rPr lang="en-US" dirty="0"/>
-              <a:t>Design an algorithm to handle stress, cumulative damage, and risk</a:t>
-            </a:r>
-          </a:p>
-          <a:p>
-            <a:pPr marL="342900" indent="-342900">
-              <a:buAutoNum type="arabicPeriod"/>
-            </a:pPr>
-            <a:r>
-              <a:rPr lang="en-US" dirty="0"/>
-              <a:t>Look for the shoulder information from 3dsspp research paper</a:t>
-            </a:r>
-          </a:p>
-          <a:p>
-            <a:pPr marL="342900" indent="-342900">
-              <a:buFont typeface="+mj-lt"/>
-              <a:buAutoNum type="arabicPeriod"/>
-            </a:pPr>
+              <a:t>Try OpenSim to obtain the low back compressive force</a:t>
+            </a:r>
             <a:endParaRPr lang="en-MY" dirty="0"/>
           </a:p>
         </p:txBody>
@@ -2734,7 +2905,7 @@
           <p:nvPr>
             <p:extLst>
               <p:ext uri="{D42A27DB-BD31-4B8C-83A1-F6EECF244321}">
-                <p14:modId xmlns:p14="http://schemas.microsoft.com/office/powerpoint/2010/main" val="330079443"/>
+                <p14:modId xmlns:p14="http://schemas.microsoft.com/office/powerpoint/2010/main" val="3689059466"/>
               </p:ext>
             </p:extLst>
           </p:nvPr>
@@ -2878,23 +3049,7 @@
                     <a:p>
                       <a:r>
                         <a:rPr lang="en-MY" dirty="0"/>
-                        <a:t>Installing </a:t>
-                      </a:r>
-                      <a:r>
-                        <a:rPr lang="en-MY" dirty="0" err="1"/>
-                        <a:t>Alphapose</a:t>
-                      </a:r>
-                      <a:r>
-                        <a:rPr lang="en-MY" dirty="0"/>
-                        <a:t>/</a:t>
-                      </a:r>
-                      <a:r>
-                        <a:rPr lang="en-MY" dirty="0" err="1"/>
-                        <a:t>Openpose</a:t>
-                      </a:r>
-                      <a:r>
-                        <a:rPr lang="en-MY" dirty="0"/>
-                        <a:t>/VideoPose3D</a:t>
+                        <a:t>Installing VideoPose3D</a:t>
                       </a:r>
                       <a:endParaRPr lang="en-US" dirty="0"/>
                     </a:p>
@@ -3200,18 +3355,10 @@
                     <a:lstStyle/>
                     <a:p>
                       <a:r>
-                        <a:rPr lang="en-MY"/>
-                        <a:t>Adding on a Cumulative Fatigue Assessment using </a:t>
+                        <a:rPr lang="en-MY" dirty="0"/>
+                        <a:t>Adding on a Cumulative Fatigue Assessment using VideoPose3D with Python</a:t>
                       </a:r>
-                      <a:r>
-                        <a:rPr lang="en-MY" err="1"/>
-                        <a:t>Alphapose</a:t>
-                      </a:r>
-                      <a:r>
-                        <a:rPr lang="en-MY"/>
-                        <a:t>/Openpose with Python</a:t>
-                      </a:r>
-                      <a:endParaRPr lang="en-US"/>
+                      <a:endParaRPr lang="en-US" dirty="0"/>
                     </a:p>
                   </a:txBody>
                   <a:tcPr/>
@@ -3235,7 +3382,7 @@
                     <a:bodyPr/>
                     <a:lstStyle/>
                     <a:p>
-                      <a:endParaRPr lang="en-US"/>
+                      <a:endParaRPr lang="en-US" dirty="0"/>
                     </a:p>
                   </a:txBody>
                   <a:tcPr/>
@@ -3356,6 +3503,102 @@
       </p:grpSpPr>
       <p:sp>
         <p:nvSpPr>
+          <p:cNvPr id="54" name="Rectangle 53">
+            <a:extLst>
+              <a:ext uri="{FF2B5EF4-FFF2-40B4-BE49-F238E27FC236}">
+                <a16:creationId xmlns:a16="http://schemas.microsoft.com/office/drawing/2014/main" id="{6C9E4E4C-A336-4C00-CAD7-40232466051F}"/>
+              </a:ext>
+            </a:extLst>
+          </p:cNvPr>
+          <p:cNvSpPr/>
+          <p:nvPr/>
+        </p:nvSpPr>
+        <p:spPr>
+          <a:xfrm>
+            <a:off x="2871467" y="1724476"/>
+            <a:ext cx="6560968" cy="2374980"/>
+          </a:xfrm>
+          <a:prstGeom prst="rect">
+            <a:avLst/>
+          </a:prstGeom>
+          <a:noFill/>
+          <a:ln>
+            <a:prstDash val="lgDash"/>
+          </a:ln>
+        </p:spPr>
+        <p:style>
+          <a:lnRef idx="2">
+            <a:schemeClr val="accent1">
+              <a:shade val="50000"/>
+            </a:schemeClr>
+          </a:lnRef>
+          <a:fillRef idx="1">
+            <a:schemeClr val="accent1"/>
+          </a:fillRef>
+          <a:effectRef idx="0">
+            <a:schemeClr val="accent1"/>
+          </a:effectRef>
+          <a:fontRef idx="minor">
+            <a:schemeClr val="lt1"/>
+          </a:fontRef>
+        </p:style>
+        <p:txBody>
+          <a:bodyPr rtlCol="0" anchor="ctr"/>
+          <a:lstStyle/>
+          <a:p>
+            <a:pPr algn="ctr"/>
+            <a:endParaRPr lang="en-SG"/>
+          </a:p>
+        </p:txBody>
+      </p:sp>
+      <p:sp>
+        <p:nvSpPr>
+          <p:cNvPr id="34" name="Rectangle 33">
+            <a:extLst>
+              <a:ext uri="{FF2B5EF4-FFF2-40B4-BE49-F238E27FC236}">
+                <a16:creationId xmlns:a16="http://schemas.microsoft.com/office/drawing/2014/main" id="{272D95B4-D62F-4326-8ED3-9CDE402ECC7C}"/>
+              </a:ext>
+            </a:extLst>
+          </p:cNvPr>
+          <p:cNvSpPr/>
+          <p:nvPr/>
+        </p:nvSpPr>
+        <p:spPr>
+          <a:xfrm>
+            <a:off x="4333897" y="1836496"/>
+            <a:ext cx="1134307" cy="523796"/>
+          </a:xfrm>
+          <a:prstGeom prst="rect">
+            <a:avLst/>
+          </a:prstGeom>
+        </p:spPr>
+        <p:style>
+          <a:lnRef idx="2">
+            <a:schemeClr val="accent1">
+              <a:shade val="50000"/>
+            </a:schemeClr>
+          </a:lnRef>
+          <a:fillRef idx="1">
+            <a:schemeClr val="accent1"/>
+          </a:fillRef>
+          <a:effectRef idx="0">
+            <a:schemeClr val="accent1"/>
+          </a:effectRef>
+          <a:fontRef idx="minor">
+            <a:schemeClr val="lt1"/>
+          </a:fontRef>
+        </p:style>
+        <p:txBody>
+          <a:bodyPr rtlCol="0" anchor="ctr"/>
+          <a:lstStyle/>
+          <a:p>
+            <a:pPr algn="ctr"/>
+            <a:endParaRPr lang="en-SG" dirty="0"/>
+          </a:p>
+        </p:txBody>
+      </p:sp>
+      <p:sp>
+        <p:nvSpPr>
           <p:cNvPr id="2" name="Title 1">
             <a:extLst>
               <a:ext uri="{FF2B5EF4-FFF2-40B4-BE49-F238E27FC236}">
@@ -3384,11 +3627,7 @@
           <a:p>
             <a:r>
               <a:rPr lang="en-MY" sz="2800" dirty="0"/>
-              <a:t>Learning How to Use </a:t>
-            </a:r>
-            <a:r>
-              <a:rPr lang="en-MY" sz="2800" dirty="0" err="1"/>
-              <a:t>OpenSim</a:t>
+              <a:t>Learning Progress of How to Use OpenSim</a:t>
             </a:r>
             <a:endParaRPr lang="en-US" sz="2800" dirty="0"/>
           </a:p>
@@ -3428,189 +3667,1051 @@
           </a:p>
         </p:txBody>
       </p:sp>
-      <p:pic>
-        <p:nvPicPr>
-          <p:cNvPr id="18" name="Picture 17">
-            <a:extLst>
-              <a:ext uri="{FF2B5EF4-FFF2-40B4-BE49-F238E27FC236}">
-                <a16:creationId xmlns:a16="http://schemas.microsoft.com/office/drawing/2014/main" id="{9FAE000C-D2CE-306D-08D6-458051881093}"/>
-              </a:ext>
-            </a:extLst>
-          </p:cNvPr>
-          <p:cNvPicPr>
-            <a:picLocks noChangeAspect="1"/>
-          </p:cNvPicPr>
+      <p:sp>
+        <p:nvSpPr>
+          <p:cNvPr id="3" name="Rectangle 2">
+            <a:extLst>
+              <a:ext uri="{FF2B5EF4-FFF2-40B4-BE49-F238E27FC236}">
+                <a16:creationId xmlns:a16="http://schemas.microsoft.com/office/drawing/2014/main" id="{0D3B9087-E737-81BA-BB81-1A5A51806182}"/>
+              </a:ext>
+            </a:extLst>
+          </p:cNvPr>
+          <p:cNvSpPr/>
           <p:nvPr/>
-        </p:nvPicPr>
-        <p:blipFill rotWithShape="1">
-          <a:blip r:embed="rId2"/>
-          <a:srcRect r="38357" b="50000"/>
-          <a:stretch/>
-        </p:blipFill>
-        <p:spPr>
-          <a:xfrm>
-            <a:off x="639504" y="1099038"/>
-            <a:ext cx="2061816" cy="2084521"/>
+        </p:nvSpPr>
+        <p:spPr>
+          <a:xfrm>
+            <a:off x="804662" y="3216675"/>
+            <a:ext cx="1325574" cy="356872"/>
           </a:xfrm>
           <a:prstGeom prst="rect">
             <a:avLst/>
           </a:prstGeom>
         </p:spPr>
-      </p:pic>
-      <p:pic>
-        <p:nvPicPr>
-          <p:cNvPr id="20" name="Picture 19">
-            <a:extLst>
-              <a:ext uri="{FF2B5EF4-FFF2-40B4-BE49-F238E27FC236}">
-                <a16:creationId xmlns:a16="http://schemas.microsoft.com/office/drawing/2014/main" id="{ED71E80B-54AE-923D-1EF6-633AC9EA701F}"/>
-              </a:ext>
-            </a:extLst>
-          </p:cNvPr>
-          <p:cNvPicPr>
-            <a:picLocks noChangeAspect="1"/>
-          </p:cNvPicPr>
+        <p:style>
+          <a:lnRef idx="2">
+            <a:schemeClr val="accent1">
+              <a:shade val="50000"/>
+            </a:schemeClr>
+          </a:lnRef>
+          <a:fillRef idx="1">
+            <a:schemeClr val="accent1"/>
+          </a:fillRef>
+          <a:effectRef idx="0">
+            <a:schemeClr val="accent1"/>
+          </a:effectRef>
+          <a:fontRef idx="minor">
+            <a:schemeClr val="lt1"/>
+          </a:fontRef>
+        </p:style>
+        <p:txBody>
+          <a:bodyPr rtlCol="0" anchor="ctr"/>
+          <a:lstStyle/>
+          <a:p>
+            <a:pPr algn="ctr"/>
+            <a:endParaRPr lang="en-SG"/>
+          </a:p>
+        </p:txBody>
+      </p:sp>
+      <p:sp>
+        <p:nvSpPr>
+          <p:cNvPr id="7" name="TextBox 6">
+            <a:extLst>
+              <a:ext uri="{FF2B5EF4-FFF2-40B4-BE49-F238E27FC236}">
+                <a16:creationId xmlns:a16="http://schemas.microsoft.com/office/drawing/2014/main" id="{2DDA4CA7-DEDA-7E08-E236-03AD2F5E10E1}"/>
+              </a:ext>
+            </a:extLst>
+          </p:cNvPr>
+          <p:cNvSpPr txBox="1"/>
           <p:nvPr/>
-        </p:nvPicPr>
-        <p:blipFill>
-          <a:blip r:embed="rId3"/>
-          <a:stretch>
-            <a:fillRect/>
-          </a:stretch>
-        </p:blipFill>
-        <p:spPr>
-          <a:xfrm>
-            <a:off x="4165552" y="1099038"/>
-            <a:ext cx="2929393" cy="2204543"/>
+        </p:nvSpPr>
+        <p:spPr>
+          <a:xfrm>
+            <a:off x="804662" y="3241222"/>
+            <a:ext cx="1325574" cy="307777"/>
           </a:xfrm>
           <a:prstGeom prst="rect">
             <a:avLst/>
           </a:prstGeom>
-        </p:spPr>
-      </p:pic>
-      <p:pic>
-        <p:nvPicPr>
-          <p:cNvPr id="22" name="Picture 21">
-            <a:extLst>
-              <a:ext uri="{FF2B5EF4-FFF2-40B4-BE49-F238E27FC236}">
-                <a16:creationId xmlns:a16="http://schemas.microsoft.com/office/drawing/2014/main" id="{A1A44742-9428-7162-9141-BC7F01725C9C}"/>
-              </a:ext>
-            </a:extLst>
-          </p:cNvPr>
-          <p:cNvPicPr>
-            <a:picLocks noChangeAspect="1"/>
-          </p:cNvPicPr>
+          <a:noFill/>
+        </p:spPr>
+        <p:txBody>
+          <a:bodyPr wrap="square" rtlCol="0">
+            <a:spAutoFit/>
+          </a:bodyPr>
+          <a:lstStyle/>
+          <a:p>
+            <a:r>
+              <a:rPr lang="en-SG" sz="1400" dirty="0"/>
+              <a:t>Vicon’s output</a:t>
+            </a:r>
+          </a:p>
+        </p:txBody>
+      </p:sp>
+      <p:sp>
+        <p:nvSpPr>
+          <p:cNvPr id="8" name="Rectangle 7">
+            <a:extLst>
+              <a:ext uri="{FF2B5EF4-FFF2-40B4-BE49-F238E27FC236}">
+                <a16:creationId xmlns:a16="http://schemas.microsoft.com/office/drawing/2014/main" id="{3372A103-A376-2C4B-BBE8-52543F9E705E}"/>
+              </a:ext>
+            </a:extLst>
+          </p:cNvPr>
+          <p:cNvSpPr/>
           <p:nvPr/>
-        </p:nvPicPr>
-        <p:blipFill>
-          <a:blip r:embed="rId4"/>
-          <a:stretch>
-            <a:fillRect/>
-          </a:stretch>
-        </p:blipFill>
-        <p:spPr>
-          <a:xfrm>
-            <a:off x="8262163" y="994275"/>
-            <a:ext cx="1754356" cy="2437683"/>
+        </p:nvSpPr>
+        <p:spPr>
+          <a:xfrm>
+            <a:off x="2951559" y="3216675"/>
+            <a:ext cx="804957" cy="356872"/>
           </a:xfrm>
           <a:prstGeom prst="rect">
             <a:avLst/>
           </a:prstGeom>
         </p:spPr>
-      </p:pic>
-      <p:pic>
-        <p:nvPicPr>
-          <p:cNvPr id="24" name="Picture 23">
-            <a:extLst>
-              <a:ext uri="{FF2B5EF4-FFF2-40B4-BE49-F238E27FC236}">
-                <a16:creationId xmlns:a16="http://schemas.microsoft.com/office/drawing/2014/main" id="{D8043B18-7C8A-EE8E-3301-C4D27F2229A5}"/>
-              </a:ext>
-            </a:extLst>
-          </p:cNvPr>
-          <p:cNvPicPr>
-            <a:picLocks noChangeAspect="1"/>
-          </p:cNvPicPr>
+        <p:style>
+          <a:lnRef idx="2">
+            <a:schemeClr val="accent1">
+              <a:shade val="50000"/>
+            </a:schemeClr>
+          </a:lnRef>
+          <a:fillRef idx="1">
+            <a:schemeClr val="accent1"/>
+          </a:fillRef>
+          <a:effectRef idx="0">
+            <a:schemeClr val="accent1"/>
+          </a:effectRef>
+          <a:fontRef idx="minor">
+            <a:schemeClr val="lt1"/>
+          </a:fontRef>
+        </p:style>
+        <p:txBody>
+          <a:bodyPr rtlCol="0" anchor="ctr"/>
+          <a:lstStyle/>
+          <a:p>
+            <a:pPr algn="ctr"/>
+            <a:endParaRPr lang="en-SG"/>
+          </a:p>
+        </p:txBody>
+      </p:sp>
+      <p:sp>
+        <p:nvSpPr>
+          <p:cNvPr id="9" name="TextBox 8">
+            <a:extLst>
+              <a:ext uri="{FF2B5EF4-FFF2-40B4-BE49-F238E27FC236}">
+                <a16:creationId xmlns:a16="http://schemas.microsoft.com/office/drawing/2014/main" id="{A9AD6494-D29E-2826-09DA-1B91CCEDC370}"/>
+              </a:ext>
+            </a:extLst>
+          </p:cNvPr>
+          <p:cNvSpPr txBox="1"/>
           <p:nvPr/>
-        </p:nvPicPr>
-        <p:blipFill>
-          <a:blip r:embed="rId5"/>
-          <a:stretch>
-            <a:fillRect/>
-          </a:stretch>
-        </p:blipFill>
-        <p:spPr>
-          <a:xfrm>
-            <a:off x="7680985" y="4133398"/>
-            <a:ext cx="2852134" cy="2084522"/>
+        </p:nvSpPr>
+        <p:spPr>
+          <a:xfrm>
+            <a:off x="2951559" y="3241222"/>
+            <a:ext cx="804957" cy="307777"/>
           </a:xfrm>
           <a:prstGeom prst="rect">
             <a:avLst/>
           </a:prstGeom>
-        </p:spPr>
-      </p:pic>
-      <p:pic>
-        <p:nvPicPr>
-          <p:cNvPr id="26" name="Picture 25">
-            <a:extLst>
-              <a:ext uri="{FF2B5EF4-FFF2-40B4-BE49-F238E27FC236}">
-                <a16:creationId xmlns:a16="http://schemas.microsoft.com/office/drawing/2014/main" id="{F8650A84-E43A-7AD6-0239-F2860C0B4CDB}"/>
-              </a:ext>
-            </a:extLst>
-          </p:cNvPr>
-          <p:cNvPicPr>
-            <a:picLocks noChangeAspect="1"/>
-          </p:cNvPicPr>
+          <a:noFill/>
+        </p:spPr>
+        <p:txBody>
+          <a:bodyPr wrap="square" rtlCol="0">
+            <a:spAutoFit/>
+          </a:bodyPr>
+          <a:lstStyle/>
+          <a:p>
+            <a:r>
+              <a:rPr lang="en-SG" sz="1400" dirty="0"/>
+              <a:t>.c3d file</a:t>
+            </a:r>
+          </a:p>
+        </p:txBody>
+      </p:sp>
+      <p:sp>
+        <p:nvSpPr>
+          <p:cNvPr id="10" name="Rectangle 9">
+            <a:extLst>
+              <a:ext uri="{FF2B5EF4-FFF2-40B4-BE49-F238E27FC236}">
+                <a16:creationId xmlns:a16="http://schemas.microsoft.com/office/drawing/2014/main" id="{6DE95B61-AFE5-08AF-D3C4-630340902407}"/>
+              </a:ext>
+            </a:extLst>
+          </p:cNvPr>
+          <p:cNvSpPr/>
           <p:nvPr/>
-        </p:nvPicPr>
-        <p:blipFill>
-          <a:blip r:embed="rId6"/>
-          <a:stretch>
-            <a:fillRect/>
-          </a:stretch>
-        </p:blipFill>
-        <p:spPr>
-          <a:xfrm>
-            <a:off x="4032003" y="4133399"/>
-            <a:ext cx="2843164" cy="2084522"/>
+        </p:nvSpPr>
+        <p:spPr>
+          <a:xfrm>
+            <a:off x="4687283" y="2835255"/>
+            <a:ext cx="456176" cy="356872"/>
           </a:xfrm>
           <a:prstGeom prst="rect">
             <a:avLst/>
           </a:prstGeom>
         </p:spPr>
-      </p:pic>
-      <p:pic>
-        <p:nvPicPr>
-          <p:cNvPr id="28" name="Picture 27">
-            <a:extLst>
-              <a:ext uri="{FF2B5EF4-FFF2-40B4-BE49-F238E27FC236}">
-                <a16:creationId xmlns:a16="http://schemas.microsoft.com/office/drawing/2014/main" id="{F7F4B583-4D20-A298-FD73-4075301A563A}"/>
-              </a:ext>
-            </a:extLst>
-          </p:cNvPr>
-          <p:cNvPicPr>
-            <a:picLocks noChangeAspect="1"/>
-          </p:cNvPicPr>
+        <p:style>
+          <a:lnRef idx="2">
+            <a:schemeClr val="accent1">
+              <a:shade val="50000"/>
+            </a:schemeClr>
+          </a:lnRef>
+          <a:fillRef idx="1">
+            <a:schemeClr val="accent1"/>
+          </a:fillRef>
+          <a:effectRef idx="0">
+            <a:schemeClr val="accent1"/>
+          </a:effectRef>
+          <a:fontRef idx="minor">
+            <a:schemeClr val="lt1"/>
+          </a:fontRef>
+        </p:style>
+        <p:txBody>
+          <a:bodyPr rtlCol="0" anchor="ctr"/>
+          <a:lstStyle/>
+          <a:p>
+            <a:pPr algn="ctr"/>
+            <a:endParaRPr lang="en-SG"/>
+          </a:p>
+        </p:txBody>
+      </p:sp>
+      <p:sp>
+        <p:nvSpPr>
+          <p:cNvPr id="11" name="TextBox 10">
+            <a:extLst>
+              <a:ext uri="{FF2B5EF4-FFF2-40B4-BE49-F238E27FC236}">
+                <a16:creationId xmlns:a16="http://schemas.microsoft.com/office/drawing/2014/main" id="{1C1A704D-EDAF-556C-B471-2BA075C926AF}"/>
+              </a:ext>
+            </a:extLst>
+          </p:cNvPr>
+          <p:cNvSpPr txBox="1"/>
           <p:nvPr/>
-        </p:nvPicPr>
-        <p:blipFill>
-          <a:blip r:embed="rId7"/>
-          <a:stretch>
-            <a:fillRect/>
-          </a:stretch>
-        </p:blipFill>
-        <p:spPr>
-          <a:xfrm>
-            <a:off x="530470" y="4133399"/>
-            <a:ext cx="2847321" cy="2084521"/>
+        </p:nvSpPr>
+        <p:spPr>
+          <a:xfrm>
+            <a:off x="4687283" y="2859802"/>
+            <a:ext cx="456176" cy="307777"/>
           </a:xfrm>
           <a:prstGeom prst="rect">
             <a:avLst/>
           </a:prstGeom>
-        </p:spPr>
-      </p:pic>
+          <a:noFill/>
+        </p:spPr>
+        <p:txBody>
+          <a:bodyPr wrap="square" rtlCol="0">
+            <a:spAutoFit/>
+          </a:bodyPr>
+          <a:lstStyle/>
+          <a:p>
+            <a:r>
+              <a:rPr lang="en-SG" sz="1400" dirty="0"/>
+              <a:t>.trc</a:t>
+            </a:r>
+          </a:p>
+        </p:txBody>
+      </p:sp>
+      <p:sp>
+        <p:nvSpPr>
+          <p:cNvPr id="12" name="Rectangle 11">
+            <a:extLst>
+              <a:ext uri="{FF2B5EF4-FFF2-40B4-BE49-F238E27FC236}">
+                <a16:creationId xmlns:a16="http://schemas.microsoft.com/office/drawing/2014/main" id="{3F4104DA-B6CA-414E-175B-0DFBB71649CE}"/>
+              </a:ext>
+            </a:extLst>
+          </p:cNvPr>
+          <p:cNvSpPr/>
+          <p:nvPr/>
+        </p:nvSpPr>
+        <p:spPr>
+          <a:xfrm>
+            <a:off x="4687282" y="3607483"/>
+            <a:ext cx="566639" cy="356872"/>
+          </a:xfrm>
+          <a:prstGeom prst="rect">
+            <a:avLst/>
+          </a:prstGeom>
+        </p:spPr>
+        <p:style>
+          <a:lnRef idx="2">
+            <a:schemeClr val="accent1">
+              <a:shade val="50000"/>
+            </a:schemeClr>
+          </a:lnRef>
+          <a:fillRef idx="1">
+            <a:schemeClr val="accent1"/>
+          </a:fillRef>
+          <a:effectRef idx="0">
+            <a:schemeClr val="accent1"/>
+          </a:effectRef>
+          <a:fontRef idx="minor">
+            <a:schemeClr val="lt1"/>
+          </a:fontRef>
+        </p:style>
+        <p:txBody>
+          <a:bodyPr rtlCol="0" anchor="ctr"/>
+          <a:lstStyle/>
+          <a:p>
+            <a:pPr algn="ctr"/>
+            <a:endParaRPr lang="en-SG"/>
+          </a:p>
+        </p:txBody>
+      </p:sp>
+      <p:sp>
+        <p:nvSpPr>
+          <p:cNvPr id="13" name="TextBox 12">
+            <a:extLst>
+              <a:ext uri="{FF2B5EF4-FFF2-40B4-BE49-F238E27FC236}">
+                <a16:creationId xmlns:a16="http://schemas.microsoft.com/office/drawing/2014/main" id="{4C888BDF-2694-F0A3-3EE0-1A57A1498781}"/>
+              </a:ext>
+            </a:extLst>
+          </p:cNvPr>
+          <p:cNvSpPr txBox="1"/>
+          <p:nvPr/>
+        </p:nvSpPr>
+        <p:spPr>
+          <a:xfrm>
+            <a:off x="4687283" y="3632030"/>
+            <a:ext cx="566638" cy="307777"/>
+          </a:xfrm>
+          <a:prstGeom prst="rect">
+            <a:avLst/>
+          </a:prstGeom>
+          <a:noFill/>
+        </p:spPr>
+        <p:txBody>
+          <a:bodyPr wrap="square" rtlCol="0">
+            <a:spAutoFit/>
+          </a:bodyPr>
+          <a:lstStyle/>
+          <a:p>
+            <a:r>
+              <a:rPr lang="en-SG" sz="1400" dirty="0"/>
+              <a:t>.mot</a:t>
+            </a:r>
+          </a:p>
+        </p:txBody>
+      </p:sp>
+      <p:sp>
+        <p:nvSpPr>
+          <p:cNvPr id="14" name="Rectangle 13">
+            <a:extLst>
+              <a:ext uri="{FF2B5EF4-FFF2-40B4-BE49-F238E27FC236}">
+                <a16:creationId xmlns:a16="http://schemas.microsoft.com/office/drawing/2014/main" id="{79AFA0EE-58BE-42BF-F7A7-A5F5004F1999}"/>
+              </a:ext>
+            </a:extLst>
+          </p:cNvPr>
+          <p:cNvSpPr/>
+          <p:nvPr/>
+        </p:nvSpPr>
+        <p:spPr>
+          <a:xfrm>
+            <a:off x="6186970" y="3094549"/>
+            <a:ext cx="891895" cy="547767"/>
+          </a:xfrm>
+          <a:prstGeom prst="rect">
+            <a:avLst/>
+          </a:prstGeom>
+        </p:spPr>
+        <p:style>
+          <a:lnRef idx="2">
+            <a:schemeClr val="accent1">
+              <a:shade val="50000"/>
+            </a:schemeClr>
+          </a:lnRef>
+          <a:fillRef idx="1">
+            <a:schemeClr val="accent1"/>
+          </a:fillRef>
+          <a:effectRef idx="0">
+            <a:schemeClr val="accent1"/>
+          </a:effectRef>
+          <a:fontRef idx="minor">
+            <a:schemeClr val="lt1"/>
+          </a:fontRef>
+        </p:style>
+        <p:txBody>
+          <a:bodyPr rtlCol="0" anchor="ctr"/>
+          <a:lstStyle/>
+          <a:p>
+            <a:pPr algn="ctr"/>
+            <a:endParaRPr lang="en-SG"/>
+          </a:p>
+        </p:txBody>
+      </p:sp>
+      <p:sp>
+        <p:nvSpPr>
+          <p:cNvPr id="15" name="TextBox 14">
+            <a:extLst>
+              <a:ext uri="{FF2B5EF4-FFF2-40B4-BE49-F238E27FC236}">
+                <a16:creationId xmlns:a16="http://schemas.microsoft.com/office/drawing/2014/main" id="{F2BFBB76-3A34-61F1-F74C-D4D82D3AE220}"/>
+              </a:ext>
+            </a:extLst>
+          </p:cNvPr>
+          <p:cNvSpPr txBox="1"/>
+          <p:nvPr/>
+        </p:nvSpPr>
+        <p:spPr>
+          <a:xfrm>
+            <a:off x="6186970" y="3119097"/>
+            <a:ext cx="891895" cy="523220"/>
+          </a:xfrm>
+          <a:prstGeom prst="rect">
+            <a:avLst/>
+          </a:prstGeom>
+          <a:noFill/>
+        </p:spPr>
+        <p:txBody>
+          <a:bodyPr wrap="square" rtlCol="0">
+            <a:spAutoFit/>
+          </a:bodyPr>
+          <a:lstStyle/>
+          <a:p>
+            <a:pPr algn="ctr"/>
+            <a:r>
+              <a:rPr lang="en-SG" sz="1400" dirty="0"/>
+              <a:t>External forces</a:t>
+            </a:r>
+          </a:p>
+        </p:txBody>
+      </p:sp>
+      <p:cxnSp>
+        <p:nvCxnSpPr>
+          <p:cNvPr id="17" name="Straight Arrow Connector 16">
+            <a:extLst>
+              <a:ext uri="{FF2B5EF4-FFF2-40B4-BE49-F238E27FC236}">
+                <a16:creationId xmlns:a16="http://schemas.microsoft.com/office/drawing/2014/main" id="{71233873-FF88-BDAA-652B-C7463AFAE4C0}"/>
+              </a:ext>
+            </a:extLst>
+          </p:cNvPr>
+          <p:cNvCxnSpPr/>
+          <p:nvPr/>
+        </p:nvCxnSpPr>
+        <p:spPr>
+          <a:xfrm>
+            <a:off x="2197740" y="3375302"/>
+            <a:ext cx="644376" cy="0"/>
+          </a:xfrm>
+          <a:prstGeom prst="straightConnector1">
+            <a:avLst/>
+          </a:prstGeom>
+          <a:ln>
+            <a:tailEnd type="triangle"/>
+          </a:ln>
+        </p:spPr>
+        <p:style>
+          <a:lnRef idx="1">
+            <a:schemeClr val="accent1"/>
+          </a:lnRef>
+          <a:fillRef idx="0">
+            <a:schemeClr val="accent1"/>
+          </a:fillRef>
+          <a:effectRef idx="0">
+            <a:schemeClr val="accent1"/>
+          </a:effectRef>
+          <a:fontRef idx="minor">
+            <a:schemeClr val="tx1"/>
+          </a:fontRef>
+        </p:style>
+      </p:cxnSp>
+      <p:cxnSp>
+        <p:nvCxnSpPr>
+          <p:cNvPr id="19" name="Straight Arrow Connector 18">
+            <a:extLst>
+              <a:ext uri="{FF2B5EF4-FFF2-40B4-BE49-F238E27FC236}">
+                <a16:creationId xmlns:a16="http://schemas.microsoft.com/office/drawing/2014/main" id="{BDA13AE8-7DC6-3530-A0F5-7BF943E55D14}"/>
+              </a:ext>
+            </a:extLst>
+          </p:cNvPr>
+          <p:cNvCxnSpPr/>
+          <p:nvPr/>
+        </p:nvCxnSpPr>
+        <p:spPr>
+          <a:xfrm flipV="1">
+            <a:off x="3848569" y="3019361"/>
+            <a:ext cx="730293" cy="355941"/>
+          </a:xfrm>
+          <a:prstGeom prst="straightConnector1">
+            <a:avLst/>
+          </a:prstGeom>
+          <a:ln>
+            <a:tailEnd type="triangle"/>
+          </a:ln>
+        </p:spPr>
+        <p:style>
+          <a:lnRef idx="1">
+            <a:schemeClr val="accent1"/>
+          </a:lnRef>
+          <a:fillRef idx="0">
+            <a:schemeClr val="accent1"/>
+          </a:fillRef>
+          <a:effectRef idx="0">
+            <a:schemeClr val="accent1"/>
+          </a:effectRef>
+          <a:fontRef idx="minor">
+            <a:schemeClr val="tx1"/>
+          </a:fontRef>
+        </p:style>
+      </p:cxnSp>
+      <p:cxnSp>
+        <p:nvCxnSpPr>
+          <p:cNvPr id="21" name="Straight Arrow Connector 20">
+            <a:extLst>
+              <a:ext uri="{FF2B5EF4-FFF2-40B4-BE49-F238E27FC236}">
+                <a16:creationId xmlns:a16="http://schemas.microsoft.com/office/drawing/2014/main" id="{A2FC2C76-4396-5012-43A6-6EC6245CB4D6}"/>
+              </a:ext>
+            </a:extLst>
+          </p:cNvPr>
+          <p:cNvCxnSpPr/>
+          <p:nvPr/>
+        </p:nvCxnSpPr>
+        <p:spPr>
+          <a:xfrm>
+            <a:off x="3848569" y="3375302"/>
+            <a:ext cx="730293" cy="411173"/>
+          </a:xfrm>
+          <a:prstGeom prst="straightConnector1">
+            <a:avLst/>
+          </a:prstGeom>
+          <a:ln>
+            <a:tailEnd type="triangle"/>
+          </a:ln>
+        </p:spPr>
+        <p:style>
+          <a:lnRef idx="1">
+            <a:schemeClr val="accent1"/>
+          </a:lnRef>
+          <a:fillRef idx="0">
+            <a:schemeClr val="accent1"/>
+          </a:fillRef>
+          <a:effectRef idx="0">
+            <a:schemeClr val="accent1"/>
+          </a:effectRef>
+          <a:fontRef idx="minor">
+            <a:schemeClr val="tx1"/>
+          </a:fontRef>
+        </p:style>
+      </p:cxnSp>
+      <p:sp>
+        <p:nvSpPr>
+          <p:cNvPr id="22" name="Right Bracket 21">
+            <a:extLst>
+              <a:ext uri="{FF2B5EF4-FFF2-40B4-BE49-F238E27FC236}">
+                <a16:creationId xmlns:a16="http://schemas.microsoft.com/office/drawing/2014/main" id="{39B36CB3-F9D4-3CE6-48EB-77104CEA4E05}"/>
+              </a:ext>
+            </a:extLst>
+          </p:cNvPr>
+          <p:cNvSpPr/>
+          <p:nvPr/>
+        </p:nvSpPr>
+        <p:spPr>
+          <a:xfrm>
+            <a:off x="5413482" y="2927307"/>
+            <a:ext cx="71600" cy="859168"/>
+          </a:xfrm>
+          <a:prstGeom prst="rightBracket">
+            <a:avLst/>
+          </a:prstGeom>
+        </p:spPr>
+        <p:style>
+          <a:lnRef idx="1">
+            <a:schemeClr val="accent1"/>
+          </a:lnRef>
+          <a:fillRef idx="0">
+            <a:schemeClr val="accent1"/>
+          </a:fillRef>
+          <a:effectRef idx="0">
+            <a:schemeClr val="accent1"/>
+          </a:effectRef>
+          <a:fontRef idx="minor">
+            <a:schemeClr val="tx1"/>
+          </a:fontRef>
+        </p:style>
+        <p:txBody>
+          <a:bodyPr rtlCol="0" anchor="ctr"/>
+          <a:lstStyle/>
+          <a:p>
+            <a:pPr algn="ctr"/>
+            <a:endParaRPr lang="en-SG"/>
+          </a:p>
+        </p:txBody>
+      </p:sp>
+      <p:cxnSp>
+        <p:nvCxnSpPr>
+          <p:cNvPr id="26" name="Straight Arrow Connector 25">
+            <a:extLst>
+              <a:ext uri="{FF2B5EF4-FFF2-40B4-BE49-F238E27FC236}">
+                <a16:creationId xmlns:a16="http://schemas.microsoft.com/office/drawing/2014/main" id="{82803B37-A496-D779-FBCA-8A6993A785A5}"/>
+              </a:ext>
+            </a:extLst>
+          </p:cNvPr>
+          <p:cNvCxnSpPr>
+            <a:cxnSpLocks/>
+            <a:stCxn id="22" idx="2"/>
+          </p:cNvCxnSpPr>
+          <p:nvPr/>
+        </p:nvCxnSpPr>
+        <p:spPr>
+          <a:xfrm>
+            <a:off x="5485082" y="3356891"/>
+            <a:ext cx="623917" cy="0"/>
+          </a:xfrm>
+          <a:prstGeom prst="straightConnector1">
+            <a:avLst/>
+          </a:prstGeom>
+          <a:ln>
+            <a:tailEnd type="triangle"/>
+          </a:ln>
+        </p:spPr>
+        <p:style>
+          <a:lnRef idx="1">
+            <a:schemeClr val="accent1"/>
+          </a:lnRef>
+          <a:fillRef idx="0">
+            <a:schemeClr val="accent1"/>
+          </a:fillRef>
+          <a:effectRef idx="0">
+            <a:schemeClr val="accent1"/>
+          </a:effectRef>
+          <a:fontRef idx="minor">
+            <a:schemeClr val="tx1"/>
+          </a:fontRef>
+        </p:style>
+      </p:cxnSp>
+      <p:sp>
+        <p:nvSpPr>
+          <p:cNvPr id="29" name="TextBox 28">
+            <a:extLst>
+              <a:ext uri="{FF2B5EF4-FFF2-40B4-BE49-F238E27FC236}">
+                <a16:creationId xmlns:a16="http://schemas.microsoft.com/office/drawing/2014/main" id="{3FB27E20-EF9F-359B-E725-72A998CC5E8B}"/>
+              </a:ext>
+            </a:extLst>
+          </p:cNvPr>
+          <p:cNvSpPr txBox="1"/>
+          <p:nvPr/>
+        </p:nvSpPr>
+        <p:spPr>
+          <a:xfrm rot="19975820">
+            <a:off x="3770398" y="2910357"/>
+            <a:ext cx="770308" cy="307777"/>
+          </a:xfrm>
+          <a:prstGeom prst="rect">
+            <a:avLst/>
+          </a:prstGeom>
+          <a:noFill/>
+        </p:spPr>
+        <p:txBody>
+          <a:bodyPr wrap="square" rtlCol="0">
+            <a:spAutoFit/>
+          </a:bodyPr>
+          <a:lstStyle/>
+          <a:p>
+            <a:r>
+              <a:rPr lang="en-SG" sz="1400" dirty="0"/>
+              <a:t>matlab</a:t>
+            </a:r>
+          </a:p>
+        </p:txBody>
+      </p:sp>
+      <p:sp>
+        <p:nvSpPr>
+          <p:cNvPr id="30" name="TextBox 29">
+            <a:extLst>
+              <a:ext uri="{FF2B5EF4-FFF2-40B4-BE49-F238E27FC236}">
+                <a16:creationId xmlns:a16="http://schemas.microsoft.com/office/drawing/2014/main" id="{8E3F49A0-DE4C-DAFB-D749-5C86EB4A2FE6}"/>
+              </a:ext>
+            </a:extLst>
+          </p:cNvPr>
+          <p:cNvSpPr txBox="1"/>
+          <p:nvPr/>
+        </p:nvSpPr>
+        <p:spPr>
+          <a:xfrm rot="1754297">
+            <a:off x="3751112" y="3521234"/>
+            <a:ext cx="770308" cy="307777"/>
+          </a:xfrm>
+          <a:prstGeom prst="rect">
+            <a:avLst/>
+          </a:prstGeom>
+          <a:noFill/>
+        </p:spPr>
+        <p:txBody>
+          <a:bodyPr wrap="square" rtlCol="0">
+            <a:spAutoFit/>
+          </a:bodyPr>
+          <a:lstStyle/>
+          <a:p>
+            <a:r>
+              <a:rPr lang="en-SG" sz="1400" dirty="0"/>
+              <a:t>matlab</a:t>
+            </a:r>
+          </a:p>
+        </p:txBody>
+      </p:sp>
+      <p:cxnSp>
+        <p:nvCxnSpPr>
+          <p:cNvPr id="32" name="Straight Arrow Connector 31">
+            <a:extLst>
+              <a:ext uri="{FF2B5EF4-FFF2-40B4-BE49-F238E27FC236}">
+                <a16:creationId xmlns:a16="http://schemas.microsoft.com/office/drawing/2014/main" id="{C7CEE956-1F95-F257-992E-2CD50AE8ABD0}"/>
+              </a:ext>
+            </a:extLst>
+          </p:cNvPr>
+          <p:cNvCxnSpPr>
+            <a:cxnSpLocks/>
+          </p:cNvCxnSpPr>
+          <p:nvPr/>
+        </p:nvCxnSpPr>
+        <p:spPr>
+          <a:xfrm flipV="1">
+            <a:off x="4915371" y="2423015"/>
+            <a:ext cx="0" cy="361440"/>
+          </a:xfrm>
+          <a:prstGeom prst="straightConnector1">
+            <a:avLst/>
+          </a:prstGeom>
+          <a:ln>
+            <a:tailEnd type="triangle"/>
+          </a:ln>
+        </p:spPr>
+        <p:style>
+          <a:lnRef idx="1">
+            <a:schemeClr val="accent1"/>
+          </a:lnRef>
+          <a:fillRef idx="0">
+            <a:schemeClr val="accent1"/>
+          </a:fillRef>
+          <a:effectRef idx="0">
+            <a:schemeClr val="accent1"/>
+          </a:effectRef>
+          <a:fontRef idx="minor">
+            <a:schemeClr val="tx1"/>
+          </a:fontRef>
+        </p:style>
+      </p:cxnSp>
+      <p:sp>
+        <p:nvSpPr>
+          <p:cNvPr id="33" name="TextBox 32">
+            <a:extLst>
+              <a:ext uri="{FF2B5EF4-FFF2-40B4-BE49-F238E27FC236}">
+                <a16:creationId xmlns:a16="http://schemas.microsoft.com/office/drawing/2014/main" id="{463DFE2B-BEBF-1D3D-86C9-38C44F68F38A}"/>
+              </a:ext>
+            </a:extLst>
+          </p:cNvPr>
+          <p:cNvSpPr txBox="1"/>
+          <p:nvPr/>
+        </p:nvSpPr>
+        <p:spPr>
+          <a:xfrm>
+            <a:off x="4378676" y="1839998"/>
+            <a:ext cx="1071777" cy="523220"/>
+          </a:xfrm>
+          <a:prstGeom prst="rect">
+            <a:avLst/>
+          </a:prstGeom>
+          <a:noFill/>
+        </p:spPr>
+        <p:txBody>
+          <a:bodyPr wrap="square" rtlCol="0">
+            <a:spAutoFit/>
+          </a:bodyPr>
+          <a:lstStyle/>
+          <a:p>
+            <a:pPr algn="ctr"/>
+            <a:r>
+              <a:rPr lang="en-SG" sz="1400" dirty="0"/>
+              <a:t>Inverse Kinematics</a:t>
+            </a:r>
+          </a:p>
+        </p:txBody>
+      </p:sp>
+      <p:cxnSp>
+        <p:nvCxnSpPr>
+          <p:cNvPr id="36" name="Connector: Elbow 35">
+            <a:extLst>
+              <a:ext uri="{FF2B5EF4-FFF2-40B4-BE49-F238E27FC236}">
+                <a16:creationId xmlns:a16="http://schemas.microsoft.com/office/drawing/2014/main" id="{393C1686-538A-3E90-3966-A61CBF0AAEB5}"/>
+              </a:ext>
+            </a:extLst>
+          </p:cNvPr>
+          <p:cNvCxnSpPr>
+            <a:cxnSpLocks/>
+          </p:cNvCxnSpPr>
+          <p:nvPr/>
+        </p:nvCxnSpPr>
+        <p:spPr>
+          <a:xfrm>
+            <a:off x="5550199" y="2082232"/>
+            <a:ext cx="2611967" cy="579965"/>
+          </a:xfrm>
+          <a:prstGeom prst="bentConnector3">
+            <a:avLst>
+              <a:gd name="adj1" fmla="val 77391"/>
+            </a:avLst>
+          </a:prstGeom>
+          <a:ln>
+            <a:tailEnd type="triangle"/>
+          </a:ln>
+        </p:spPr>
+        <p:style>
+          <a:lnRef idx="1">
+            <a:schemeClr val="accent1"/>
+          </a:lnRef>
+          <a:fillRef idx="0">
+            <a:schemeClr val="accent1"/>
+          </a:fillRef>
+          <a:effectRef idx="0">
+            <a:schemeClr val="accent1"/>
+          </a:effectRef>
+          <a:fontRef idx="minor">
+            <a:schemeClr val="tx1"/>
+          </a:fontRef>
+        </p:style>
+      </p:cxnSp>
+      <p:cxnSp>
+        <p:nvCxnSpPr>
+          <p:cNvPr id="50" name="Connector: Elbow 49">
+            <a:extLst>
+              <a:ext uri="{FF2B5EF4-FFF2-40B4-BE49-F238E27FC236}">
+                <a16:creationId xmlns:a16="http://schemas.microsoft.com/office/drawing/2014/main" id="{561AAA28-D41B-C76E-06F7-40D1E986E9CB}"/>
+              </a:ext>
+            </a:extLst>
+          </p:cNvPr>
+          <p:cNvCxnSpPr/>
+          <p:nvPr/>
+        </p:nvCxnSpPr>
+        <p:spPr>
+          <a:xfrm rot="5400000" flipH="1" flipV="1">
+            <a:off x="7016806" y="2800022"/>
+            <a:ext cx="690518" cy="414867"/>
+          </a:xfrm>
+          <a:prstGeom prst="bentConnector3">
+            <a:avLst>
+              <a:gd name="adj1" fmla="val -885"/>
+            </a:avLst>
+          </a:prstGeom>
+          <a:ln w="9525"/>
+        </p:spPr>
+        <p:style>
+          <a:lnRef idx="1">
+            <a:schemeClr val="accent1"/>
+          </a:lnRef>
+          <a:fillRef idx="0">
+            <a:schemeClr val="accent1"/>
+          </a:fillRef>
+          <a:effectRef idx="0">
+            <a:schemeClr val="accent1"/>
+          </a:effectRef>
+          <a:fontRef idx="minor">
+            <a:schemeClr val="tx1"/>
+          </a:fontRef>
+        </p:style>
+      </p:cxnSp>
+      <p:sp>
+        <p:nvSpPr>
+          <p:cNvPr id="52" name="Rectangle 51">
+            <a:extLst>
+              <a:ext uri="{FF2B5EF4-FFF2-40B4-BE49-F238E27FC236}">
+                <a16:creationId xmlns:a16="http://schemas.microsoft.com/office/drawing/2014/main" id="{178F4F93-9B34-FBD7-2CA9-53787C6D4A89}"/>
+              </a:ext>
+            </a:extLst>
+          </p:cNvPr>
+          <p:cNvSpPr/>
+          <p:nvPr/>
+        </p:nvSpPr>
+        <p:spPr>
+          <a:xfrm>
+            <a:off x="8193153" y="2397084"/>
+            <a:ext cx="1134307" cy="523796"/>
+          </a:xfrm>
+          <a:prstGeom prst="rect">
+            <a:avLst/>
+          </a:prstGeom>
+        </p:spPr>
+        <p:style>
+          <a:lnRef idx="2">
+            <a:schemeClr val="accent1">
+              <a:shade val="50000"/>
+            </a:schemeClr>
+          </a:lnRef>
+          <a:fillRef idx="1">
+            <a:schemeClr val="accent1"/>
+          </a:fillRef>
+          <a:effectRef idx="0">
+            <a:schemeClr val="accent1"/>
+          </a:effectRef>
+          <a:fontRef idx="minor">
+            <a:schemeClr val="lt1"/>
+          </a:fontRef>
+        </p:style>
+        <p:txBody>
+          <a:bodyPr rtlCol="0" anchor="ctr"/>
+          <a:lstStyle/>
+          <a:p>
+            <a:pPr algn="ctr"/>
+            <a:endParaRPr lang="en-SG" dirty="0"/>
+          </a:p>
+        </p:txBody>
+      </p:sp>
+      <p:sp>
+        <p:nvSpPr>
+          <p:cNvPr id="53" name="TextBox 52">
+            <a:extLst>
+              <a:ext uri="{FF2B5EF4-FFF2-40B4-BE49-F238E27FC236}">
+                <a16:creationId xmlns:a16="http://schemas.microsoft.com/office/drawing/2014/main" id="{8D1D53E2-BE70-3696-D512-3A4BD40B9444}"/>
+              </a:ext>
+            </a:extLst>
+          </p:cNvPr>
+          <p:cNvSpPr txBox="1"/>
+          <p:nvPr/>
+        </p:nvSpPr>
+        <p:spPr>
+          <a:xfrm>
+            <a:off x="8237932" y="2400586"/>
+            <a:ext cx="1071777" cy="523220"/>
+          </a:xfrm>
+          <a:prstGeom prst="rect">
+            <a:avLst/>
+          </a:prstGeom>
+          <a:noFill/>
+        </p:spPr>
+        <p:txBody>
+          <a:bodyPr wrap="square" rtlCol="0">
+            <a:spAutoFit/>
+          </a:bodyPr>
+          <a:lstStyle/>
+          <a:p>
+            <a:pPr algn="ctr"/>
+            <a:r>
+              <a:rPr lang="en-SG" sz="1400" dirty="0"/>
+              <a:t>Inverse Dynamics</a:t>
+            </a:r>
+          </a:p>
+        </p:txBody>
+      </p:sp>
+      <p:sp>
+        <p:nvSpPr>
+          <p:cNvPr id="57" name="TextBox 56">
+            <a:extLst>
+              <a:ext uri="{FF2B5EF4-FFF2-40B4-BE49-F238E27FC236}">
+                <a16:creationId xmlns:a16="http://schemas.microsoft.com/office/drawing/2014/main" id="{A467E1FE-1915-012F-047A-BF7631EB8D1C}"/>
+              </a:ext>
+            </a:extLst>
+          </p:cNvPr>
+          <p:cNvSpPr txBox="1"/>
+          <p:nvPr/>
+        </p:nvSpPr>
+        <p:spPr>
+          <a:xfrm>
+            <a:off x="804662" y="4579381"/>
+            <a:ext cx="9995579" cy="830997"/>
+          </a:xfrm>
+          <a:prstGeom prst="rect">
+            <a:avLst/>
+          </a:prstGeom>
+          <a:noFill/>
+        </p:spPr>
+        <p:txBody>
+          <a:bodyPr wrap="square" rtlCol="0">
+            <a:spAutoFit/>
+          </a:bodyPr>
+          <a:lstStyle/>
+          <a:p>
+            <a:r>
+              <a:rPr lang="en-SG" sz="1600" b="1" dirty="0"/>
+              <a:t>***</a:t>
+            </a:r>
+          </a:p>
+          <a:p>
+            <a:r>
+              <a:rPr lang="en-SG" sz="1600" b="1" dirty="0"/>
+              <a:t>VideoPose3D’s output is only 3D coordinates. Hence, we have insufficient data compared to the output of Vicon</a:t>
+            </a:r>
+          </a:p>
+        </p:txBody>
+      </p:sp>
+      <p:sp>
+        <p:nvSpPr>
+          <p:cNvPr id="58" name="TextBox 57">
+            <a:extLst>
+              <a:ext uri="{FF2B5EF4-FFF2-40B4-BE49-F238E27FC236}">
+                <a16:creationId xmlns:a16="http://schemas.microsoft.com/office/drawing/2014/main" id="{53A75160-94E1-0B80-EB3D-B7D746C00826}"/>
+              </a:ext>
+            </a:extLst>
+          </p:cNvPr>
+          <p:cNvSpPr txBox="1"/>
+          <p:nvPr/>
+        </p:nvSpPr>
+        <p:spPr>
+          <a:xfrm>
+            <a:off x="8185808" y="2946283"/>
+            <a:ext cx="1176023" cy="307777"/>
+          </a:xfrm>
+          <a:prstGeom prst="rect">
+            <a:avLst/>
+          </a:prstGeom>
+          <a:noFill/>
+        </p:spPr>
+        <p:txBody>
+          <a:bodyPr wrap="square" rtlCol="0">
+            <a:spAutoFit/>
+          </a:bodyPr>
+          <a:lstStyle/>
+          <a:p>
+            <a:pPr algn="ctr"/>
+            <a:r>
+              <a:rPr lang="en-SG" sz="1400" b="1" dirty="0"/>
+              <a:t>(Our Goal)</a:t>
+            </a:r>
+          </a:p>
+        </p:txBody>
+      </p:sp>
+      <p:sp>
+        <p:nvSpPr>
+          <p:cNvPr id="59" name="TextBox 58">
+            <a:extLst>
+              <a:ext uri="{FF2B5EF4-FFF2-40B4-BE49-F238E27FC236}">
+                <a16:creationId xmlns:a16="http://schemas.microsoft.com/office/drawing/2014/main" id="{0649BEC3-5742-A0D1-2BEC-A0D22263AC91}"/>
+              </a:ext>
+            </a:extLst>
+          </p:cNvPr>
+          <p:cNvSpPr txBox="1"/>
+          <p:nvPr/>
+        </p:nvSpPr>
+        <p:spPr>
+          <a:xfrm>
+            <a:off x="530470" y="5877580"/>
+            <a:ext cx="10264359" cy="523220"/>
+          </a:xfrm>
+          <a:prstGeom prst="rect">
+            <a:avLst/>
+          </a:prstGeom>
+          <a:noFill/>
+        </p:spPr>
+        <p:txBody>
+          <a:bodyPr wrap="square" rtlCol="0">
+            <a:spAutoFit/>
+          </a:bodyPr>
+          <a:lstStyle/>
+          <a:p>
+            <a:r>
+              <a:rPr lang="en-SG" sz="1400" i="1" dirty="0"/>
+              <a:t>Tutorial link：</a:t>
+            </a:r>
+          </a:p>
+          <a:p>
+            <a:r>
+              <a:rPr lang="en-SG" sz="1400" dirty="0">
+                <a:hlinkClick r:id="rId2"/>
+              </a:rPr>
+              <a:t>https://www.bilibili.com/video/BV1Wt4y1n7uX/?spm_id_from=333.788&amp;vd_source=6e380ccb0d7a82414250ff3d722d2770</a:t>
+            </a:r>
+            <a:endParaRPr lang="en-SG" sz="1400" dirty="0"/>
+          </a:p>
+        </p:txBody>
+      </p:sp>
     </p:spTree>
     <p:extLst>
       <p:ext uri="{BB962C8B-B14F-4D97-AF65-F5344CB8AC3E}">
-        <p14:creationId xmlns:p14="http://schemas.microsoft.com/office/powerpoint/2010/main" val="1156467062"/>
+        <p14:creationId xmlns:p14="http://schemas.microsoft.com/office/powerpoint/2010/main" val="4025225109"/>
       </p:ext>
     </p:extLst>
   </p:cSld>
@@ -3667,11 +4768,7 @@
           <a:p>
             <a:r>
               <a:rPr lang="en-MY" sz="2800" dirty="0"/>
-              <a:t>                  Our Method              VS             </a:t>
-            </a:r>
-            <a:r>
-              <a:rPr lang="en-MY" sz="2800" dirty="0" err="1"/>
-              <a:t>OpenSim</a:t>
+              <a:t>                  Our Method              VS             OpenSim </a:t>
             </a:r>
             <a:endParaRPr lang="en-US" sz="2800" dirty="0"/>
           </a:p>
@@ -3695,7 +4792,7 @@
         </p:nvSpPr>
         <p:spPr>
           <a:xfrm>
-            <a:off x="10287000" y="6035040"/>
+            <a:off x="10974215" y="6090273"/>
             <a:ext cx="838200" cy="365760"/>
           </a:xfrm>
         </p:spPr>
@@ -3707,7 +4804,7 @@
               <a:rPr lang="en-US" smtClean="0"/>
               <a:t>5</a:t>
             </a:fld>
-            <a:endParaRPr lang="en-US"/>
+            <a:endParaRPr lang="en-US" dirty="0"/>
           </a:p>
         </p:txBody>
       </p:sp>
@@ -3832,8 +4929,8 @@
         </p:blipFill>
         <p:spPr>
           <a:xfrm>
-            <a:off x="718639" y="2629618"/>
-            <a:ext cx="4933755" cy="3496019"/>
+            <a:off x="718640" y="2629619"/>
+            <a:ext cx="4651160" cy="3295774"/>
           </a:xfrm>
           <a:prstGeom prst="rect">
             <a:avLst/>
@@ -3862,14 +4959,85 @@
         </p:blipFill>
         <p:spPr>
           <a:xfrm>
-            <a:off x="6716321" y="2630363"/>
-            <a:ext cx="3264889" cy="3495274"/>
+            <a:off x="6716322" y="2630363"/>
+            <a:ext cx="3077844" cy="3295030"/>
           </a:xfrm>
           <a:prstGeom prst="rect">
             <a:avLst/>
           </a:prstGeom>
         </p:spPr>
       </p:pic>
+      <p:sp>
+        <p:nvSpPr>
+          <p:cNvPr id="3" name="TextBox 2">
+            <a:extLst>
+              <a:ext uri="{FF2B5EF4-FFF2-40B4-BE49-F238E27FC236}">
+                <a16:creationId xmlns:a16="http://schemas.microsoft.com/office/drawing/2014/main" id="{866B7E0E-815E-1AA1-BDC3-7E92475E3CA4}"/>
+              </a:ext>
+            </a:extLst>
+          </p:cNvPr>
+          <p:cNvSpPr txBox="1"/>
+          <p:nvPr/>
+        </p:nvSpPr>
+        <p:spPr>
+          <a:xfrm>
+            <a:off x="9294239" y="660495"/>
+            <a:ext cx="1373942" cy="523220"/>
+          </a:xfrm>
+          <a:prstGeom prst="rect">
+            <a:avLst/>
+          </a:prstGeom>
+          <a:noFill/>
+        </p:spPr>
+        <p:txBody>
+          <a:bodyPr wrap="square" rtlCol="0">
+            <a:spAutoFit/>
+          </a:bodyPr>
+          <a:lstStyle/>
+          <a:p>
+            <a:pPr algn="ctr"/>
+            <a:r>
+              <a:rPr lang="en-SG" sz="1400" dirty="0"/>
+              <a:t>Results from a research paper</a:t>
+            </a:r>
+          </a:p>
+        </p:txBody>
+      </p:sp>
+      <p:sp>
+        <p:nvSpPr>
+          <p:cNvPr id="7" name="TextBox 6">
+            <a:extLst>
+              <a:ext uri="{FF2B5EF4-FFF2-40B4-BE49-F238E27FC236}">
+                <a16:creationId xmlns:a16="http://schemas.microsoft.com/office/drawing/2014/main" id="{CC3448A4-F54E-6D66-3E19-5B2CFC8F9708}"/>
+              </a:ext>
+            </a:extLst>
+          </p:cNvPr>
+          <p:cNvSpPr txBox="1"/>
+          <p:nvPr/>
+        </p:nvSpPr>
+        <p:spPr>
+          <a:xfrm>
+            <a:off x="447090" y="6166760"/>
+            <a:ext cx="11035073" cy="276999"/>
+          </a:xfrm>
+          <a:prstGeom prst="rect">
+            <a:avLst/>
+          </a:prstGeom>
+          <a:noFill/>
+        </p:spPr>
+        <p:txBody>
+          <a:bodyPr wrap="square" rtlCol="0">
+            <a:spAutoFit/>
+          </a:bodyPr>
+          <a:lstStyle/>
+          <a:p>
+            <a:r>
+              <a:rPr lang="en-SG" sz="1200" i="1" dirty="0"/>
+              <a:t>Estimation of lumbar spinal loading and trunk muscle forces during asymmetric lifting tasks application of whole body musculoskeletal modelling in OpenSim</a:t>
+            </a:r>
+          </a:p>
+        </p:txBody>
+      </p:sp>
     </p:spTree>
     <p:extLst>
       <p:ext uri="{BB962C8B-B14F-4D97-AF65-F5344CB8AC3E}">
@@ -3973,7 +5141,7 @@
         <p:spPr>
           <a:xfrm>
             <a:off x="1271443" y="1769915"/>
-            <a:ext cx="10392510" cy="465640"/>
+            <a:ext cx="10392510" cy="1712135"/>
           </a:xfrm>
           <a:prstGeom prst="rect">
             <a:avLst/>
@@ -3994,13 +5162,8 @@
             </a:pPr>
             <a:r>
               <a:rPr lang="en-US" dirty="0"/>
-              <a:t>Learning </a:t>
-            </a:r>
-            <a:r>
-              <a:rPr lang="en-US" dirty="0" err="1"/>
-              <a:t>OpenSim</a:t>
-            </a:r>
-            <a:endParaRPr lang="en-US" dirty="0"/>
+              <a:t>The doors are still open as long as we can find out what information needs to be filled out in the .c3d file then we can convert. However, I feel like OpenSim is designed for the conventional marker-based motion capture system, it’s not user friendly to visual-based motion capture system. Therefore, this conversion could be very complex.</a:t>
+            </a:r>
           </a:p>
         </p:txBody>
       </p:sp>
@@ -4050,71 +5213,23 @@
             <p:ph type="title"/>
           </p:nvPr>
         </p:nvSpPr>
-        <p:spPr/>
-        <p:txBody>
-          <a:bodyPr/>
-          <a:lstStyle/>
-          <a:p>
-            <a:r>
-              <a:rPr lang="en-MY" dirty="0"/>
-              <a:t>Next Meeting</a:t>
-            </a:r>
-            <a:endParaRPr lang="en-US" dirty="0"/>
-          </a:p>
-        </p:txBody>
-      </p:sp>
-      <p:sp>
-        <p:nvSpPr>
-          <p:cNvPr id="6" name="TextBox 5">
-            <a:extLst>
-              <a:ext uri="{FF2B5EF4-FFF2-40B4-BE49-F238E27FC236}">
-                <a16:creationId xmlns:a16="http://schemas.microsoft.com/office/drawing/2014/main" id="{5CD50B1F-CE0D-FED6-70A2-576A7E6C8A86}"/>
-              </a:ext>
-            </a:extLst>
-          </p:cNvPr>
-          <p:cNvSpPr txBox="1"/>
-          <p:nvPr/>
-        </p:nvSpPr>
-        <p:spPr>
-          <a:xfrm>
-            <a:off x="839585" y="2014194"/>
-            <a:ext cx="10687130" cy="646331"/>
-          </a:xfrm>
-          <a:prstGeom prst="rect">
-            <a:avLst/>
-          </a:prstGeom>
-          <a:noFill/>
-        </p:spPr>
-        <p:txBody>
-          <a:bodyPr wrap="square" rtlCol="0">
-            <a:spAutoFit/>
+        <p:spPr>
+          <a:xfrm>
+            <a:off x="1023841" y="483034"/>
+            <a:ext cx="8163117" cy="738211"/>
+          </a:xfrm>
+        </p:spPr>
+        <p:txBody>
+          <a:bodyPr>
+            <a:normAutofit/>
           </a:bodyPr>
           <a:lstStyle/>
           <a:p>
-            <a:pPr marL="342900" indent="-342900">
-              <a:buAutoNum type="arabicPeriod"/>
-            </a:pPr>
-            <a:r>
-              <a:rPr lang="en-US" dirty="0"/>
-              <a:t>Conclude our current results</a:t>
-            </a:r>
-          </a:p>
-          <a:p>
-            <a:pPr marL="342900" indent="-342900">
-              <a:buAutoNum type="arabicPeriod"/>
-            </a:pPr>
-            <a:r>
-              <a:rPr lang="en-US" dirty="0"/>
-              <a:t>Plan for the next step (research paper, conference, </a:t>
-            </a:r>
-            <a:r>
-              <a:rPr lang="en-US" dirty="0" err="1"/>
-              <a:t>etc</a:t>
-            </a:r>
-            <a:r>
-              <a:rPr lang="en-US" dirty="0"/>
-              <a:t>)</a:t>
-            </a:r>
+            <a:r>
+              <a:rPr lang="en-MY" sz="3200" dirty="0"/>
+              <a:t>Virtual Meeting, Summit, Symposium</a:t>
+            </a:r>
+            <a:endParaRPr lang="en-US" sz="3200" dirty="0"/>
           </a:p>
         </p:txBody>
       </p:sp>
@@ -4123,7 +5238,7 @@
           <p:cNvPr id="3" name="Slide Number Placeholder 2">
             <a:extLst>
               <a:ext uri="{FF2B5EF4-FFF2-40B4-BE49-F238E27FC236}">
-                <a16:creationId xmlns:a16="http://schemas.microsoft.com/office/drawing/2014/main" id="{91D23FCB-73D4-C331-2251-938DEFF248B4}"/>
+                <a16:creationId xmlns:a16="http://schemas.microsoft.com/office/drawing/2014/main" id="{3301FDD1-104B-C9B8-98AD-09C0483E990B}"/>
               </a:ext>
             </a:extLst>
           </p:cNvPr>
@@ -4147,10 +5262,453 @@
           </a:p>
         </p:txBody>
       </p:sp>
+      <p:sp>
+        <p:nvSpPr>
+          <p:cNvPr id="4" name="TextBox 3">
+            <a:extLst>
+              <a:ext uri="{FF2B5EF4-FFF2-40B4-BE49-F238E27FC236}">
+                <a16:creationId xmlns:a16="http://schemas.microsoft.com/office/drawing/2014/main" id="{7B46C7D6-9AA3-F564-4F35-B86153603C2F}"/>
+              </a:ext>
+            </a:extLst>
+          </p:cNvPr>
+          <p:cNvSpPr txBox="1"/>
+          <p:nvPr/>
+        </p:nvSpPr>
+        <p:spPr>
+          <a:xfrm>
+            <a:off x="1289853" y="1221245"/>
+            <a:ext cx="10392510" cy="5230150"/>
+          </a:xfrm>
+          <a:prstGeom prst="rect">
+            <a:avLst/>
+          </a:prstGeom>
+          <a:noFill/>
+        </p:spPr>
+        <p:txBody>
+          <a:bodyPr wrap="square" rtlCol="0">
+            <a:spAutoFit/>
+          </a:bodyPr>
+          <a:lstStyle/>
+          <a:p>
+            <a:pPr marL="342900" indent="-342900">
+              <a:lnSpc>
+                <a:spcPct val="150000"/>
+              </a:lnSpc>
+              <a:buAutoNum type="arabicPeriod"/>
+            </a:pPr>
+            <a:r>
+              <a:rPr lang="en-US" sz="1400" dirty="0"/>
+              <a:t>Virtual Office Hours for Biomechanical Modeling or Machine Learning Research Questions</a:t>
+            </a:r>
+          </a:p>
+          <a:p>
+            <a:pPr marL="800100" lvl="1" indent="-342900">
+              <a:lnSpc>
+                <a:spcPct val="150000"/>
+              </a:lnSpc>
+              <a:buAutoNum type="arabicPeriod"/>
+            </a:pPr>
+            <a:r>
+              <a:rPr lang="en-US" sz="1400" dirty="0"/>
+              <a:t>Date: 8 – 12 May 2023</a:t>
+            </a:r>
+          </a:p>
+          <a:p>
+            <a:pPr marL="800100" lvl="1" indent="-342900">
+              <a:lnSpc>
+                <a:spcPct val="150000"/>
+              </a:lnSpc>
+              <a:buAutoNum type="arabicPeriod"/>
+            </a:pPr>
+            <a:r>
+              <a:rPr lang="en-US" sz="1400" dirty="0"/>
+              <a:t>Venue: Online</a:t>
+            </a:r>
+          </a:p>
+          <a:p>
+            <a:pPr marL="800100" lvl="1" indent="-342900">
+              <a:lnSpc>
+                <a:spcPct val="150000"/>
+              </a:lnSpc>
+              <a:buAutoNum type="arabicPeriod"/>
+            </a:pPr>
+            <a:r>
+              <a:rPr lang="en-US" sz="1400" dirty="0"/>
+              <a:t>Deadline: 21 April 2023</a:t>
+            </a:r>
+          </a:p>
+          <a:p>
+            <a:pPr marL="342900" indent="-342900">
+              <a:lnSpc>
+                <a:spcPct val="150000"/>
+              </a:lnSpc>
+              <a:buAutoNum type="arabicPeriod"/>
+            </a:pPr>
+            <a:r>
+              <a:rPr lang="en-US" sz="1400" dirty="0"/>
+              <a:t>Models &amp; Sensors to Measure Real-World Muscle Function &amp; Movement</a:t>
+            </a:r>
+          </a:p>
+          <a:p>
+            <a:pPr marL="800100" lvl="1" indent="-342900">
+              <a:lnSpc>
+                <a:spcPct val="150000"/>
+              </a:lnSpc>
+              <a:buAutoNum type="arabicPeriod"/>
+            </a:pPr>
+            <a:r>
+              <a:rPr lang="en-US" sz="1400" dirty="0"/>
+              <a:t>Date: 18 June 2023</a:t>
+            </a:r>
+          </a:p>
+          <a:p>
+            <a:pPr marL="800100" lvl="1" indent="-342900">
+              <a:lnSpc>
+                <a:spcPct val="150000"/>
+              </a:lnSpc>
+              <a:buAutoNum type="arabicPeriod"/>
+            </a:pPr>
+            <a:r>
+              <a:rPr lang="en-US" sz="1400" dirty="0"/>
+              <a:t>Venue: Alberta, Canada</a:t>
+            </a:r>
+          </a:p>
+          <a:p>
+            <a:pPr marL="800100" lvl="1" indent="-342900">
+              <a:lnSpc>
+                <a:spcPct val="150000"/>
+              </a:lnSpc>
+              <a:buAutoNum type="arabicPeriod"/>
+            </a:pPr>
+            <a:r>
+              <a:rPr lang="en-US" sz="1400" dirty="0"/>
+              <a:t>Registration Fee: 50 USD</a:t>
+            </a:r>
+          </a:p>
+          <a:p>
+            <a:pPr marL="800100" lvl="1" indent="-342900">
+              <a:lnSpc>
+                <a:spcPct val="150000"/>
+              </a:lnSpc>
+              <a:buAutoNum type="arabicPeriod"/>
+            </a:pPr>
+            <a:r>
+              <a:rPr lang="en-US" sz="1400" dirty="0"/>
+              <a:t>Deadline: 3 April 2023</a:t>
+            </a:r>
+          </a:p>
+          <a:p>
+            <a:pPr marL="800100" lvl="1" indent="-342900">
+              <a:lnSpc>
+                <a:spcPct val="150000"/>
+              </a:lnSpc>
+              <a:buAutoNum type="arabicPeriod"/>
+            </a:pPr>
+            <a:r>
+              <a:rPr lang="en-US" sz="1400" dirty="0"/>
+              <a:t>Remarks: Submission of research abstract is required</a:t>
+            </a:r>
+          </a:p>
+          <a:p>
+            <a:pPr marL="342900" indent="-342900">
+              <a:lnSpc>
+                <a:spcPct val="150000"/>
+              </a:lnSpc>
+              <a:buAutoNum type="arabicPeriod"/>
+            </a:pPr>
+            <a:r>
+              <a:rPr lang="en-US" sz="1400" dirty="0"/>
+              <a:t>Rocky mountain muscle symposium (limited slots)</a:t>
+            </a:r>
+          </a:p>
+          <a:p>
+            <a:pPr marL="800100" lvl="1" indent="-342900">
+              <a:lnSpc>
+                <a:spcPct val="150000"/>
+              </a:lnSpc>
+              <a:buAutoNum type="arabicPeriod"/>
+            </a:pPr>
+            <a:r>
+              <a:rPr lang="en-US" sz="1400" dirty="0"/>
+              <a:t>Date: 19 – 21 June 2023</a:t>
+            </a:r>
+          </a:p>
+          <a:p>
+            <a:pPr marL="800100" lvl="1" indent="-342900">
+              <a:lnSpc>
+                <a:spcPct val="150000"/>
+              </a:lnSpc>
+              <a:buAutoNum type="arabicPeriod"/>
+            </a:pPr>
+            <a:r>
+              <a:rPr lang="en-US" sz="1400" dirty="0"/>
+              <a:t>Venue: Alberta, Canada</a:t>
+            </a:r>
+          </a:p>
+          <a:p>
+            <a:pPr marL="800100" lvl="1" indent="-342900">
+              <a:lnSpc>
+                <a:spcPct val="150000"/>
+              </a:lnSpc>
+              <a:buAutoNum type="arabicPeriod"/>
+            </a:pPr>
+            <a:r>
+              <a:rPr lang="en-US" sz="1400" dirty="0"/>
+              <a:t>Registration Fee: 450 USD (</a:t>
+            </a:r>
+            <a:r>
+              <a:rPr lang="en-US" sz="1400" b="1" dirty="0"/>
+              <a:t>Normal</a:t>
+            </a:r>
+            <a:r>
+              <a:rPr lang="en-US" sz="1400" dirty="0"/>
+              <a:t>), 350 USD (</a:t>
+            </a:r>
+            <a:r>
+              <a:rPr lang="en-US" sz="1400" b="1" dirty="0"/>
+              <a:t>Student</a:t>
+            </a:r>
+            <a:r>
+              <a:rPr lang="en-US" sz="1400" dirty="0"/>
+              <a:t>)  / 525 USD (</a:t>
+            </a:r>
+            <a:r>
+              <a:rPr lang="en-US" sz="1400" b="1" dirty="0"/>
+              <a:t>Normal</a:t>
+            </a:r>
+            <a:r>
+              <a:rPr lang="en-US" sz="1400" dirty="0"/>
+              <a:t>), 425 USD (</a:t>
+            </a:r>
+            <a:r>
+              <a:rPr lang="en-US" sz="1400" b="1" dirty="0"/>
+              <a:t>Student</a:t>
+            </a:r>
+            <a:r>
+              <a:rPr lang="en-US" sz="1400" dirty="0"/>
+              <a:t>)</a:t>
+            </a:r>
+          </a:p>
+          <a:p>
+            <a:pPr marL="800100" lvl="1" indent="-342900">
+              <a:lnSpc>
+                <a:spcPct val="150000"/>
+              </a:lnSpc>
+              <a:buAutoNum type="arabicPeriod"/>
+            </a:pPr>
+            <a:r>
+              <a:rPr lang="en-US" sz="1400" dirty="0"/>
+              <a:t>Deadline: 14 April 2023</a:t>
+            </a:r>
+          </a:p>
+          <a:p>
+            <a:pPr marL="800100" lvl="1" indent="-342900">
+              <a:lnSpc>
+                <a:spcPct val="150000"/>
+              </a:lnSpc>
+              <a:buAutoNum type="arabicPeriod"/>
+            </a:pPr>
+            <a:r>
+              <a:rPr lang="en-US" sz="1400" dirty="0"/>
+              <a:t>Remarks: Submission of research abstract is required</a:t>
+            </a:r>
+          </a:p>
+        </p:txBody>
+      </p:sp>
     </p:spTree>
     <p:extLst>
       <p:ext uri="{BB962C8B-B14F-4D97-AF65-F5344CB8AC3E}">
-        <p14:creationId xmlns:p14="http://schemas.microsoft.com/office/powerpoint/2010/main" val="2699799663"/>
+        <p14:creationId xmlns:p14="http://schemas.microsoft.com/office/powerpoint/2010/main" val="1830226559"/>
+      </p:ext>
+    </p:extLst>
+  </p:cSld>
+  <p:clrMapOvr>
+    <a:masterClrMapping/>
+  </p:clrMapOvr>
+</p:sld>
+</file>
+
+<file path=ppt/slides/slide8.xml><?xml version="1.0" encoding="utf-8"?>
+<p:sld xmlns:a="http://schemas.openxmlformats.org/drawingml/2006/main" xmlns:r="http://schemas.openxmlformats.org/officeDocument/2006/relationships" xmlns:p="http://schemas.openxmlformats.org/presentationml/2006/main">
+  <p:cSld>
+    <p:spTree>
+      <p:nvGrpSpPr>
+        <p:cNvPr id="1" name=""/>
+        <p:cNvGrpSpPr/>
+        <p:nvPr/>
+      </p:nvGrpSpPr>
+      <p:grpSpPr>
+        <a:xfrm>
+          <a:off x="0" y="0"/>
+          <a:ext cx="0" cy="0"/>
+          <a:chOff x="0" y="0"/>
+          <a:chExt cx="0" cy="0"/>
+        </a:xfrm>
+      </p:grpSpPr>
+      <p:sp>
+        <p:nvSpPr>
+          <p:cNvPr id="2" name="Title 1">
+            <a:extLst>
+              <a:ext uri="{FF2B5EF4-FFF2-40B4-BE49-F238E27FC236}">
+                <a16:creationId xmlns:a16="http://schemas.microsoft.com/office/drawing/2014/main" id="{7A52E233-DA80-5A3A-534F-8A98B545F1D9}"/>
+              </a:ext>
+            </a:extLst>
+          </p:cNvPr>
+          <p:cNvSpPr>
+            <a:spLocks noGrp="1"/>
+          </p:cNvSpPr>
+          <p:nvPr>
+            <p:ph type="title"/>
+          </p:nvPr>
+        </p:nvSpPr>
+        <p:spPr>
+          <a:xfrm>
+            <a:off x="4367436" y="3059894"/>
+            <a:ext cx="3549181" cy="738211"/>
+          </a:xfrm>
+        </p:spPr>
+        <p:txBody>
+          <a:bodyPr>
+            <a:normAutofit/>
+          </a:bodyPr>
+          <a:lstStyle/>
+          <a:p>
+            <a:r>
+              <a:rPr lang="en-MY" sz="3200" dirty="0"/>
+              <a:t>Data Collection</a:t>
+            </a:r>
+            <a:endParaRPr lang="en-US" sz="3200" dirty="0"/>
+          </a:p>
+        </p:txBody>
+      </p:sp>
+      <p:sp>
+        <p:nvSpPr>
+          <p:cNvPr id="3" name="Slide Number Placeholder 2">
+            <a:extLst>
+              <a:ext uri="{FF2B5EF4-FFF2-40B4-BE49-F238E27FC236}">
+                <a16:creationId xmlns:a16="http://schemas.microsoft.com/office/drawing/2014/main" id="{3301FDD1-104B-C9B8-98AD-09C0483E990B}"/>
+              </a:ext>
+            </a:extLst>
+          </p:cNvPr>
+          <p:cNvSpPr>
+            <a:spLocks noGrp="1"/>
+          </p:cNvSpPr>
+          <p:nvPr>
+            <p:ph type="sldNum" sz="quarter" idx="12"/>
+          </p:nvPr>
+        </p:nvSpPr>
+        <p:spPr/>
+        <p:txBody>
+          <a:bodyPr/>
+          <a:lstStyle/>
+          <a:p>
+            <a:fld id="{34B7E4EF-A1BD-40F4-AB7B-04F084DD991D}" type="slidenum">
+              <a:rPr lang="en-US" smtClean="0"/>
+              <a:t>8</a:t>
+            </a:fld>
+            <a:endParaRPr lang="en-US"/>
+          </a:p>
+        </p:txBody>
+      </p:sp>
+    </p:spTree>
+    <p:extLst>
+      <p:ext uri="{BB962C8B-B14F-4D97-AF65-F5344CB8AC3E}">
+        <p14:creationId xmlns:p14="http://schemas.microsoft.com/office/powerpoint/2010/main" val="2396147512"/>
+      </p:ext>
+    </p:extLst>
+  </p:cSld>
+  <p:clrMapOvr>
+    <a:masterClrMapping/>
+  </p:clrMapOvr>
+</p:sld>
+</file>
+
+<file path=ppt/slides/slide9.xml><?xml version="1.0" encoding="utf-8"?>
+<p:sld xmlns:a="http://schemas.openxmlformats.org/drawingml/2006/main" xmlns:r="http://schemas.openxmlformats.org/officeDocument/2006/relationships" xmlns:p="http://schemas.openxmlformats.org/presentationml/2006/main">
+  <p:cSld>
+    <p:spTree>
+      <p:nvGrpSpPr>
+        <p:cNvPr id="1" name=""/>
+        <p:cNvGrpSpPr/>
+        <p:nvPr/>
+      </p:nvGrpSpPr>
+      <p:grpSpPr>
+        <a:xfrm>
+          <a:off x="0" y="0"/>
+          <a:ext cx="0" cy="0"/>
+          <a:chOff x="0" y="0"/>
+          <a:chExt cx="0" cy="0"/>
+        </a:xfrm>
+      </p:grpSpPr>
+      <p:sp>
+        <p:nvSpPr>
+          <p:cNvPr id="2" name="Title 1">
+            <a:extLst>
+              <a:ext uri="{FF2B5EF4-FFF2-40B4-BE49-F238E27FC236}">
+                <a16:creationId xmlns:a16="http://schemas.microsoft.com/office/drawing/2014/main" id="{7A52E233-DA80-5A3A-534F-8A98B545F1D9}"/>
+              </a:ext>
+            </a:extLst>
+          </p:cNvPr>
+          <p:cNvSpPr>
+            <a:spLocks noGrp="1"/>
+          </p:cNvSpPr>
+          <p:nvPr>
+            <p:ph type="title"/>
+          </p:nvPr>
+        </p:nvSpPr>
+        <p:spPr>
+          <a:xfrm>
+            <a:off x="2962083" y="2831938"/>
+            <a:ext cx="8163117" cy="738211"/>
+          </a:xfrm>
+        </p:spPr>
+        <p:txBody>
+          <a:bodyPr>
+            <a:normAutofit/>
+          </a:bodyPr>
+          <a:lstStyle/>
+          <a:p>
+            <a:r>
+              <a:rPr lang="en-MY" sz="3200" dirty="0"/>
+              <a:t>Meeting Time after Final Exam</a:t>
+            </a:r>
+            <a:endParaRPr lang="en-US" sz="3200" dirty="0"/>
+          </a:p>
+        </p:txBody>
+      </p:sp>
+      <p:sp>
+        <p:nvSpPr>
+          <p:cNvPr id="3" name="Slide Number Placeholder 2">
+            <a:extLst>
+              <a:ext uri="{FF2B5EF4-FFF2-40B4-BE49-F238E27FC236}">
+                <a16:creationId xmlns:a16="http://schemas.microsoft.com/office/drawing/2014/main" id="{3301FDD1-104B-C9B8-98AD-09C0483E990B}"/>
+              </a:ext>
+            </a:extLst>
+          </p:cNvPr>
+          <p:cNvSpPr>
+            <a:spLocks noGrp="1"/>
+          </p:cNvSpPr>
+          <p:nvPr>
+            <p:ph type="sldNum" sz="quarter" idx="12"/>
+          </p:nvPr>
+        </p:nvSpPr>
+        <p:spPr/>
+        <p:txBody>
+          <a:bodyPr/>
+          <a:lstStyle/>
+          <a:p>
+            <a:fld id="{34B7E4EF-A1BD-40F4-AB7B-04F084DD991D}" type="slidenum">
+              <a:rPr lang="en-US" smtClean="0"/>
+              <a:t>9</a:t>
+            </a:fld>
+            <a:endParaRPr lang="en-US"/>
+          </a:p>
+        </p:txBody>
+      </p:sp>
+    </p:spTree>
+    <p:extLst>
+      <p:ext uri="{BB962C8B-B14F-4D97-AF65-F5344CB8AC3E}">
+        <p14:creationId xmlns:p14="http://schemas.microsoft.com/office/powerpoint/2010/main" val="3622684778"/>
       </p:ext>
     </p:extLst>
   </p:cSld>

</xml_diff>